<commit_message>
Fixed mistake in notebook + poster
</commit_message>
<xml_diff>
--- a/Poster.pptx
+++ b/Poster.pptx
@@ -2998,7 +2998,7 @@
           <p:nvPr/>
         </p:nvPicPr>
         <p:blipFill>
-          <a:blip r:embed="rId2">
+          <a:blip r:embed="rId3">
             <a:extLst>
               <a:ext uri="{28A0092B-C50C-407E-A947-70E740481C1C}">
                 <a14:useLocalDpi xmlns:a14="http://schemas.microsoft.com/office/drawing/2010/main" val="0"/>
@@ -3769,13 +3769,13 @@
             </a:r>
             <a:r>
               <a:rPr lang="en-GB" sz="2800" dirty="0">
-                <a:hlinkClick r:id="rId3"/>
+                <a:hlinkClick r:id="rId4"/>
               </a:rPr>
               <a:t>https://</a:t>
             </a:r>
             <a:r>
               <a:rPr lang="en-GB" sz="2800" dirty="0" smtClean="0">
-                <a:hlinkClick r:id="rId3"/>
+                <a:hlinkClick r:id="rId4"/>
               </a:rPr>
               <a:t>voice.mozilla.org/en/datasets</a:t>
             </a:r>
@@ -3800,19 +3800,19 @@
             </a:r>
             <a:r>
               <a:rPr lang="en-GB" sz="2800" dirty="0" smtClean="0">
-                <a:hlinkClick r:id="rId4"/>
+                <a:hlinkClick r:id="rId5"/>
               </a:rPr>
               <a:t>https</a:t>
             </a:r>
             <a:r>
               <a:rPr lang="en-GB" sz="2800" dirty="0">
-                <a:hlinkClick r:id="rId4"/>
+                <a:hlinkClick r:id="rId5"/>
               </a:rPr>
               <a:t>://</a:t>
             </a:r>
             <a:r>
               <a:rPr lang="en-GB" sz="2800" dirty="0" smtClean="0">
-                <a:hlinkClick r:id="rId4"/>
+                <a:hlinkClick r:id="rId5"/>
               </a:rPr>
               <a:t>towardsdatascience.com/extract-features-of-music-75a3f9bc265d</a:t>
             </a:r>
@@ -3849,7 +3849,7 @@
             </a:r>
             <a:r>
               <a:rPr lang="en-GB" sz="2800" dirty="0" smtClean="0">
-                <a:hlinkClick r:id="rId5"/>
+                <a:hlinkClick r:id="rId6"/>
               </a:rPr>
               <a:t>https://librosa.github.io/librosa/</a:t>
             </a:r>
@@ -3878,13 +3878,13 @@
             </a:r>
             <a:r>
               <a:rPr lang="en-GB" sz="2800" dirty="0" err="1" smtClean="0">
-                <a:hlinkClick r:id="rId6"/>
+                <a:hlinkClick r:id="rId7"/>
               </a:rPr>
               <a:t>Scikit</a:t>
             </a:r>
             <a:r>
               <a:rPr lang="en-GB" sz="2800" dirty="0" smtClean="0">
-                <a:hlinkClick r:id="rId6"/>
+                <a:hlinkClick r:id="rId7"/>
               </a:rPr>
               <a:t>-learn: Machine Learning in Python</a:t>
             </a:r>
@@ -3932,13 +3932,13 @@
             </a:r>
             <a:r>
               <a:rPr lang="en-GB" sz="2800" dirty="0">
-                <a:hlinkClick r:id="rId4"/>
+                <a:hlinkClick r:id="rId5"/>
               </a:rPr>
               <a:t>https://</a:t>
             </a:r>
             <a:r>
               <a:rPr lang="en-GB" sz="2800" dirty="0" smtClean="0">
-                <a:hlinkClick r:id="rId4"/>
+                <a:hlinkClick r:id="rId5"/>
               </a:rPr>
               <a:t>towardsdatascience.com/extract-features-of-music-75a3f9bc265d</a:t>
             </a:r>
@@ -3955,7 +3955,7 @@
           <p:nvPr/>
         </p:nvPicPr>
         <p:blipFill>
-          <a:blip r:embed="rId7">
+          <a:blip r:embed="rId8">
             <a:extLst>
               <a:ext uri="{28A0092B-C50C-407E-A947-70E740481C1C}">
                 <a14:useLocalDpi xmlns:a14="http://schemas.microsoft.com/office/drawing/2010/main" val="0"/>
@@ -4095,7 +4095,7 @@
           <p:nvPr/>
         </p:nvPicPr>
         <p:blipFill>
-          <a:blip r:embed="rId8">
+          <a:blip r:embed="rId9">
             <a:extLst>
               <a:ext uri="{28A0092B-C50C-407E-A947-70E740481C1C}">
                 <a14:useLocalDpi xmlns:a14="http://schemas.microsoft.com/office/drawing/2010/main" val="0"/>
@@ -4130,7 +4130,7 @@
           <p:nvPr/>
         </p:nvPicPr>
         <p:blipFill>
-          <a:blip r:embed="rId9">
+          <a:blip r:embed="rId10">
             <a:extLst>
               <a:ext uri="{28A0092B-C50C-407E-A947-70E740481C1C}">
                 <a14:useLocalDpi xmlns:a14="http://schemas.microsoft.com/office/drawing/2010/main" val="0"/>
@@ -4165,7 +4165,7 @@
           <p:nvPr/>
         </p:nvPicPr>
         <p:blipFill>
-          <a:blip r:embed="rId10">
+          <a:blip r:embed="rId11">
             <a:extLst>
               <a:ext uri="{28A0092B-C50C-407E-A947-70E740481C1C}">
                 <a14:useLocalDpi xmlns:a14="http://schemas.microsoft.com/office/drawing/2010/main" val="0"/>
@@ -4276,7 +4276,7 @@
         <p:spPr>
           <a:xfrm>
             <a:off x="15343047" y="19575930"/>
-            <a:ext cx="14404179" cy="2677656"/>
+            <a:ext cx="14404179" cy="3293209"/>
           </a:xfrm>
           <a:prstGeom prst="rect">
             <a:avLst/>
@@ -4290,8 +4290,19 @@
           <a:lstStyle/>
           <a:p>
             <a:r>
+              <a:rPr lang="en-GB" sz="4000" dirty="0" smtClean="0"/>
+              <a:t>Gender</a:t>
+            </a:r>
+            <a:endParaRPr lang="en-GB" sz="2800" dirty="0"/>
+          </a:p>
+          <a:p>
+            <a:r>
               <a:rPr lang="en-GB" sz="2800" dirty="0" smtClean="0"/>
-              <a:t>We trained our models on the English dataset. By just keeping gender classes “male” and “female” we could get a balanced </a:t>
+              <a:t>We </a:t>
+            </a:r>
+            <a:r>
+              <a:rPr lang="en-GB" sz="2800" dirty="0" smtClean="0"/>
+              <a:t>trained our models on the English dataset. By just keeping gender classes “male” and “female” we could get a balanced </a:t>
             </a:r>
             <a:r>
               <a:rPr lang="en-GB" sz="2800" dirty="0"/>
@@ -4299,7 +4310,19 @@
             </a:r>
             <a:r>
               <a:rPr lang="en-GB" sz="2800" dirty="0" smtClean="0"/>
-              <a:t>11583 rows. This gave us accuracy of 91.80% using the Random Forest algorithm and *** accuracy using linear SVM.</a:t>
+              <a:t>11583 rows. This gave us accuracy of 91.80% using the Random Forest algorithm and </a:t>
+            </a:r>
+            <a:r>
+              <a:rPr lang="en-GB" sz="2800" dirty="0" smtClean="0"/>
+              <a:t>81.24%</a:t>
+            </a:r>
+            <a:r>
+              <a:rPr lang="en-GB" sz="2800" dirty="0" smtClean="0"/>
+              <a:t> </a:t>
+            </a:r>
+            <a:r>
+              <a:rPr lang="en-GB" sz="2800" dirty="0" smtClean="0"/>
+              <a:t>accuracy using linear SVM.</a:t>
             </a:r>
           </a:p>
           <a:p>
@@ -4314,8 +4337,124 @@
           <a:p>
             <a:r>
               <a:rPr lang="en-GB" sz="2800" dirty="0" smtClean="0"/>
-              <a:t>Estonian – RF accuracy: *** , SVM(Linear) accuracy: ***</a:t>
-            </a:r>
+              <a:t>Estonian – RF accuracy: </a:t>
+            </a:r>
+            <a:r>
+              <a:rPr lang="en-GB" sz="2800" dirty="0" smtClean="0"/>
+              <a:t>87.92%</a:t>
+            </a:r>
+            <a:r>
+              <a:rPr lang="en-GB" sz="2800" dirty="0" smtClean="0"/>
+              <a:t> </a:t>
+            </a:r>
+            <a:r>
+              <a:rPr lang="en-GB" sz="2800" dirty="0" smtClean="0"/>
+              <a:t>, SVM(Linear) accuracy: </a:t>
+            </a:r>
+            <a:r>
+              <a:rPr lang="en-GB" sz="2800" dirty="0" smtClean="0"/>
+              <a:t>86.22%</a:t>
+            </a:r>
+            <a:endParaRPr lang="en-GB" sz="2800" dirty="0" smtClean="0"/>
+          </a:p>
+        </p:txBody>
+      </p:sp>
+      <p:graphicFrame>
+        <p:nvGraphicFramePr>
+          <p:cNvPr id="30" name="Object 29"/>
+          <p:cNvGraphicFramePr>
+            <a:graphicFrameLocks noChangeAspect="1"/>
+          </p:cNvGraphicFramePr>
+          <p:nvPr>
+            <p:extLst>
+              <p:ext uri="{D42A27DB-BD31-4B8C-83A1-F6EECF244321}">
+                <p14:modId xmlns:p14="http://schemas.microsoft.com/office/powerpoint/2010/main" val="1245204435"/>
+              </p:ext>
+            </p:extLst>
+          </p:nvPr>
+        </p:nvGraphicFramePr>
+        <p:xfrm>
+          <a:off x="25071003" y="21222534"/>
+          <a:ext cx="5092633" cy="4093342"/>
+        </p:xfrm>
+        <a:graphic>
+          <a:graphicData uri="http://schemas.openxmlformats.org/presentationml/2006/ole">
+            <mc:AlternateContent xmlns:mc="http://schemas.openxmlformats.org/markup-compatibility/2006">
+              <mc:Choice xmlns:v="urn:schemas-microsoft-com:vml" Requires="v">
+                <p:oleObj spid="_x0000_s1028" name="PDF" r:id="rId12" imgW="0" imgH="360" progId="FoxitReader.Document">
+                  <p:embed/>
+                </p:oleObj>
+              </mc:Choice>
+              <mc:Fallback>
+                <p:oleObj name="PDF" r:id="rId12" imgW="0" imgH="360" progId="FoxitReader.Document">
+                  <p:embed/>
+                  <p:pic>
+                    <p:nvPicPr>
+                      <p:cNvPr id="0" name=""/>
+                      <p:cNvPicPr/>
+                      <p:nvPr/>
+                    </p:nvPicPr>
+                    <p:blipFill>
+                      <a:blip r:embed="rId13"/>
+                      <a:stretch>
+                        <a:fillRect/>
+                      </a:stretch>
+                    </p:blipFill>
+                    <p:spPr>
+                      <a:xfrm>
+                        <a:off x="25071003" y="21222534"/>
+                        <a:ext cx="5092633" cy="4093342"/>
+                      </a:xfrm>
+                      <a:prstGeom prst="rect">
+                        <a:avLst/>
+                      </a:prstGeom>
+                    </p:spPr>
+                  </p:pic>
+                </p:oleObj>
+              </mc:Fallback>
+            </mc:AlternateContent>
+          </a:graphicData>
+        </a:graphic>
+      </p:graphicFrame>
+      <p:sp>
+        <p:nvSpPr>
+          <p:cNvPr id="38" name="TextBox 37"/>
+          <p:cNvSpPr txBox="1"/>
+          <p:nvPr/>
+        </p:nvSpPr>
+        <p:spPr>
+          <a:xfrm>
+            <a:off x="15434642" y="27026891"/>
+            <a:ext cx="1604991" cy="1938992"/>
+          </a:xfrm>
+          <a:prstGeom prst="rect">
+            <a:avLst/>
+          </a:prstGeom>
+          <a:noFill/>
+        </p:spPr>
+        <p:txBody>
+          <a:bodyPr wrap="none" rtlCol="0">
+            <a:spAutoFit/>
+          </a:bodyPr>
+          <a:lstStyle/>
+          <a:p>
+            <a:r>
+              <a:rPr lang="en-GB" sz="4000" dirty="0" smtClean="0"/>
+              <a:t>Accent</a:t>
+            </a:r>
+          </a:p>
+          <a:p>
+            <a:r>
+              <a:rPr lang="en-GB" sz="4000" dirty="0" smtClean="0"/>
+              <a:t>---</a:t>
+            </a:r>
+          </a:p>
+          <a:p>
+            <a:r>
+              <a:rPr lang="en-GB" sz="4000" dirty="0" smtClean="0"/>
+              <a:t>---</a:t>
+            </a:r>
+            <a:endParaRPr lang="en-GB" sz="4000" dirty="0"/>
           </a:p>
         </p:txBody>
       </p:sp>

</xml_diff>

<commit_message>
Poster + notebook more data
</commit_message>
<xml_diff>
--- a/Poster.pptx
+++ b/Poster.pptx
@@ -4276,7 +4276,7 @@
         <p:spPr>
           <a:xfrm>
             <a:off x="15343047" y="19575930"/>
-            <a:ext cx="14404179" cy="3293209"/>
+            <a:ext cx="14404179" cy="6740307"/>
           </a:xfrm>
           <a:prstGeom prst="rect">
             <a:avLst/>
@@ -4298,11 +4298,7 @@
           <a:p>
             <a:r>
               <a:rPr lang="en-GB" sz="2800" dirty="0" smtClean="0"/>
-              <a:t>We </a:t>
-            </a:r>
-            <a:r>
-              <a:rPr lang="en-GB" sz="2800" dirty="0" smtClean="0"/>
-              <a:t>trained our models on the English dataset. By just keeping gender classes “male” and “female” we could get a balanced </a:t>
+              <a:t>We trained our models on the English dataset. By just keeping gender classes “male” and “female” we could get a balanced </a:t>
             </a:r>
             <a:r>
               <a:rPr lang="en-GB" sz="2800" dirty="0"/>
@@ -4310,19 +4306,7 @@
             </a:r>
             <a:r>
               <a:rPr lang="en-GB" sz="2800" dirty="0" smtClean="0"/>
-              <a:t>11583 rows. This gave us accuracy of 91.80% using the Random Forest algorithm and </a:t>
-            </a:r>
-            <a:r>
-              <a:rPr lang="en-GB" sz="2800" dirty="0" smtClean="0"/>
-              <a:t>81.24%</a:t>
-            </a:r>
-            <a:r>
-              <a:rPr lang="en-GB" sz="2800" dirty="0" smtClean="0"/>
-              <a:t> </a:t>
-            </a:r>
-            <a:r>
-              <a:rPr lang="en-GB" sz="2800" dirty="0" smtClean="0"/>
-              <a:t>accuracy using linear SVM.</a:t>
+              <a:t>11583 rows. This gave us accuracy of 91.80% using the Random Forest algorithm and 81.24% accuracy using linear SVM.</a:t>
             </a:r>
           </a:p>
           <a:p>
@@ -4337,24 +4321,112 @@
           <a:p>
             <a:r>
               <a:rPr lang="en-GB" sz="2800" dirty="0" smtClean="0"/>
-              <a:t>Estonian – RF accuracy: </a:t>
+              <a:t>Estonian – RF accuracy: 87.92% , SVM(Linear) accuracy: 86.22</a:t>
             </a:r>
             <a:r>
               <a:rPr lang="en-GB" sz="2800" dirty="0" smtClean="0"/>
-              <a:t>87.92%</a:t>
-            </a:r>
+              <a:t>%</a:t>
+            </a:r>
+          </a:p>
+          <a:p>
             <a:r>
               <a:rPr lang="en-GB" sz="2800" dirty="0" smtClean="0"/>
-              <a:t> </a:t>
+              <a:t>Swedish </a:t>
+            </a:r>
+            <a:r>
+              <a:rPr lang="en-GB" sz="2800" dirty="0"/>
+              <a:t>– RF accuracy: </a:t>
             </a:r>
             <a:r>
               <a:rPr lang="en-GB" sz="2800" dirty="0" smtClean="0"/>
+              <a:t>89.72% </a:t>
+            </a:r>
+            <a:r>
+              <a:rPr lang="en-GB" sz="2800" dirty="0"/>
               <a:t>, SVM(Linear) accuracy: </a:t>
             </a:r>
             <a:r>
               <a:rPr lang="en-GB" sz="2800" dirty="0" smtClean="0"/>
-              <a:t>86.22%</a:t>
-            </a:r>
+              <a:t>84.64%</a:t>
+            </a:r>
+          </a:p>
+          <a:p>
+            <a:r>
+              <a:rPr lang="en-GB" sz="2800" dirty="0" smtClean="0"/>
+              <a:t>Russian </a:t>
+            </a:r>
+            <a:r>
+              <a:rPr lang="en-GB" sz="2800" dirty="0"/>
+              <a:t>– RF accuracy: </a:t>
+            </a:r>
+            <a:r>
+              <a:rPr lang="en-GB" sz="2800" dirty="0" smtClean="0"/>
+              <a:t>90.78% </a:t>
+            </a:r>
+            <a:r>
+              <a:rPr lang="en-GB" sz="2800" dirty="0"/>
+              <a:t>, SVM(Linear) accuracy: </a:t>
+            </a:r>
+            <a:r>
+              <a:rPr lang="en-GB" sz="2800" dirty="0" smtClean="0"/>
+              <a:t>87.24%</a:t>
+            </a:r>
+          </a:p>
+          <a:p>
+            <a:r>
+              <a:rPr lang="en-GB" sz="2800" dirty="0" smtClean="0"/>
+              <a:t>Chinese – </a:t>
+            </a:r>
+            <a:r>
+              <a:rPr lang="en-GB" sz="2800" dirty="0"/>
+              <a:t>RF accuracy</a:t>
+            </a:r>
+            <a:r>
+              <a:rPr lang="en-GB" sz="2800" dirty="0" smtClean="0"/>
+              <a:t>: 91.03% </a:t>
+            </a:r>
+            <a:r>
+              <a:rPr lang="en-GB" sz="2800" dirty="0"/>
+              <a:t>, SVM(Linear) accuracy: </a:t>
+            </a:r>
+            <a:r>
+              <a:rPr lang="en-GB" sz="2800" dirty="0" smtClean="0"/>
+              <a:t>86.98%</a:t>
+            </a:r>
+          </a:p>
+          <a:p>
+            <a:r>
+              <a:rPr lang="en-GB" sz="2800" dirty="0" smtClean="0"/>
+              <a:t>Italian </a:t>
+            </a:r>
+            <a:r>
+              <a:rPr lang="en-GB" sz="2800" dirty="0"/>
+              <a:t>– RF accuracy: </a:t>
+            </a:r>
+            <a:r>
+              <a:rPr lang="en-GB" sz="2800" dirty="0" smtClean="0"/>
+              <a:t>80.51% </a:t>
+            </a:r>
+            <a:r>
+              <a:rPr lang="en-GB" sz="2800" dirty="0"/>
+              <a:t>, SVM(Linear) accuracy: </a:t>
+            </a:r>
+            <a:r>
+              <a:rPr lang="en-GB" sz="2800" dirty="0" smtClean="0"/>
+              <a:t>85.43%</a:t>
+            </a:r>
+            <a:endParaRPr lang="en-GB" sz="2800" dirty="0"/>
+          </a:p>
+          <a:p>
+            <a:endParaRPr lang="en-GB" sz="2800" dirty="0"/>
+          </a:p>
+          <a:p>
+            <a:endParaRPr lang="en-GB" sz="2800" dirty="0"/>
+          </a:p>
+          <a:p>
+            <a:endParaRPr lang="en-GB" sz="2800" dirty="0"/>
+          </a:p>
+          <a:p>
             <a:endParaRPr lang="en-GB" sz="2800" dirty="0" smtClean="0"/>
           </a:p>
         </p:txBody>
@@ -4381,7 +4453,7 @@
           <a:graphicData uri="http://schemas.openxmlformats.org/presentationml/2006/ole">
             <mc:AlternateContent xmlns:mc="http://schemas.openxmlformats.org/markup-compatibility/2006">
               <mc:Choice xmlns:v="urn:schemas-microsoft-com:vml" Requires="v">
-                <p:oleObj spid="_x0000_s1028" name="PDF" r:id="rId12" imgW="0" imgH="360" progId="FoxitReader.Document">
+                <p:oleObj spid="_x0000_s1029" name="PDF" r:id="rId12" imgW="0" imgH="360" progId="FoxitReader.Document">
                   <p:embed/>
                 </p:oleObj>
               </mc:Choice>

</xml_diff>